<commit_message>
Fixed links and JSON parsing
</commit_message>
<xml_diff>
--- a/lectures/590-lecture-2.pptx
+++ b/lectures/590-lecture-2.pptx
@@ -33,6 +33,10 @@
     <p:sldId id="281" r:id="rId27"/>
     <p:sldId id="282" r:id="rId28"/>
     <p:sldId id="283" r:id="rId29"/>
+    <p:sldId id="284" r:id="rId30"/>
+    <p:sldId id="285" r:id="rId31"/>
+    <p:sldId id="286" r:id="rId32"/>
+    <p:sldId id="287" r:id="rId33"/>
   </p:sldIdLst>
   <p:sldSz cx="9144000" cy="5143500" type="screen16x9"/>
   <p:notesSz cx="6858000" cy="9144000"/>
@@ -3164,15 +3168,6 @@
             </a:r>
           </a:p>
           <a:p>
-            <a:pPr lvl="0" indent="0" marL="0">
-              <a:buNone/>
-            </a:pPr>
-            <a:r>
-              <a:rPr/>
-              <a:t>asdf</a:t>
-            </a:r>
-          </a:p>
-          <a:p>
             <a:pPr lvl="0"/>
             <a:r>
               <a:rPr/>
@@ -3198,15 +3193,6 @@
             <a:r>
               <a:rPr/>
               <a:t>Design, Method and Structure of the Literature Review (hour 3)</a:t>
-            </a:r>
-          </a:p>
-          <a:p>
-            <a:pPr lvl="0" indent="0" marL="0">
-              <a:buNone/>
-            </a:pPr>
-            <a:r>
-              <a:rPr/>
-              <a:t>Academic Audiences and Techniques of Persuasion | Where’s the Gap? Mapping a Field |</a:t>
             </a:r>
           </a:p>
         </p:txBody>
@@ -3443,54 +3429,6 @@
               <a:t>: think of the Literature Review as a mini-research project within the project ( / article / dissertation)</a:t>
             </a:r>
           </a:p>
-          <a:p>
-            <a:pPr lvl="0"/>
-            <a:r>
-              <a:rPr/>
-              <a:t>Learn from Marx:</a:t>
-            </a:r>
-          </a:p>
-          <a:p>
-            <a:pPr lvl="1"/>
-            <a:r>
-              <a:rPr/>
-              <a:t>Order of </a:t>
-            </a:r>
-            <a:r>
-              <a:rPr b="1"/>
-              <a:t>analysis</a:t>
-            </a:r>
-            <a:r>
-              <a:rPr/>
-              <a:t> is different from order of </a:t>
-            </a:r>
-            <a:r>
-              <a:rPr b="1"/>
-              <a:t>presentation</a:t>
-            </a:r>
-          </a:p>
-          <a:p>
-            <a:pPr lvl="2"/>
-            <a:r>
-              <a:rPr/>
-              <a:t>In analysis we go from concrete (stuff we see) to abstract (concepts of thought)</a:t>
-            </a:r>
-          </a:p>
-          <a:p>
-            <a:pPr lvl="2"/>
-            <a:r>
-              <a:rPr/>
-              <a:t>In presentation, we go from abstract (concepts) to concrete (the world of experience) - </a:t>
-            </a:r>
-            <a:r>
-              <a:rPr b="1"/>
-              <a:t>explaining</a:t>
-            </a:r>
-            <a:r>
-              <a:rPr/>
-              <a:t> the world of experience</a:t>
-            </a:r>
-          </a:p>
         </p:txBody>
       </p:sp>
     </p:spTree>
@@ -3499,6 +3437,175 @@
 </file>
 
 <file path=ppt/slides/slide12.xml><?xml version="1.0" encoding="utf-8"?>
+<p:sld xmlns:a="http://schemas.openxmlformats.org/drawingml/2006/main" xmlns:r="http://schemas.openxmlformats.org/officeDocument/2006/relationships" xmlns:p="http://schemas.openxmlformats.org/presentationml/2006/main">
+  <p:cSld>
+    <p:spTree>
+      <p:nvGrpSpPr>
+        <p:cNvPr id="1" name=""/>
+        <p:cNvGrpSpPr/>
+        <p:nvPr/>
+      </p:nvGrpSpPr>
+      <p:grpSpPr>
+        <a:xfrm>
+          <a:off x="0" y="0"/>
+          <a:ext cx="0" cy="0"/>
+          <a:chOff x="0" y="0"/>
+          <a:chExt cx="0" cy="0"/>
+        </a:xfrm>
+      </p:grpSpPr>
+      <p:sp>
+        <p:nvSpPr>
+          <p:cNvPr id="2" name="Title 1"/>
+          <p:cNvSpPr>
+            <a:spLocks noGrp="1"/>
+          </p:cNvSpPr>
+          <p:nvPr>
+            <p:ph type="title"/>
+          </p:nvPr>
+        </p:nvSpPr>
+        <p:spPr>
+          <a:xfrm>
+            <a:off x="457201" y="204787"/>
+            <a:ext cx="3008313" cy="871538"/>
+          </a:xfrm>
+        </p:spPr>
+        <p:txBody>
+          <a:bodyPr/>
+          <a:lstStyle/>
+          <a:p>
+            <a:pPr lvl="0" indent="0" marL="0">
+              <a:buNone/>
+            </a:pPr>
+            <a:r>
+              <a:rPr/>
+              <a:t>Learn from Marx?</a:t>
+            </a:r>
+          </a:p>
+        </p:txBody>
+      </p:sp>
+      <p:sp>
+        <p:nvSpPr>
+          <p:cNvPr id="4" name="Text Placeholder 3"/>
+          <p:cNvSpPr>
+            <a:spLocks noGrp="1"/>
+          </p:cNvSpPr>
+          <p:nvPr>
+            <p:ph idx="2" sz="half" type="body"/>
+          </p:nvPr>
+        </p:nvSpPr>
+        <p:spPr/>
+        <p:txBody>
+          <a:bodyPr/>
+          <a:lstStyle/>
+          <a:p>
+            <a:pPr lvl="0"/>
+            <a:r>
+              <a:rPr/>
+              <a:t>Order of </a:t>
+            </a:r>
+            <a:r>
+              <a:rPr b="1"/>
+              <a:t>analysis</a:t>
+            </a:r>
+            <a:r>
+              <a:rPr/>
+              <a:t> is different from order of </a:t>
+            </a:r>
+            <a:r>
+              <a:rPr b="1"/>
+              <a:t>presentation</a:t>
+            </a:r>
+          </a:p>
+          <a:p>
+            <a:pPr lvl="1"/>
+            <a:r>
+              <a:rPr/>
+              <a:t>In analysis we go from concrete (stuff we see) to abstract (concepts of thought)</a:t>
+            </a:r>
+          </a:p>
+          <a:p>
+            <a:pPr lvl="1"/>
+            <a:r>
+              <a:rPr/>
+              <a:t>In presentation, we go from abstract (concepts) to concrete (the world of experience) - </a:t>
+            </a:r>
+            <a:r>
+              <a:rPr b="1"/>
+              <a:t>explaining</a:t>
+            </a:r>
+            <a:r>
+              <a:rPr/>
+              <a:t> the world of experience</a:t>
+            </a:r>
+          </a:p>
+        </p:txBody>
+      </p:sp>
+      <p:pic>
+        <p:nvPicPr>
+          <p:cNvPr descr="images/pasted-image-2025-10-27T20-32-03-568Z-232d5b70.png" id="0" name="Picture 1"/>
+          <p:cNvPicPr>
+            <a:picLocks noGrp="1" noChangeAspect="1"/>
+          </p:cNvPicPr>
+          <p:nvPr/>
+        </p:nvPicPr>
+        <p:blipFill>
+          <a:blip r:embed="rId2"/>
+          <a:stretch>
+            <a:fillRect/>
+          </a:stretch>
+        </p:blipFill>
+        <p:spPr bwMode="auto">
+          <a:xfrm>
+            <a:off x="4191000" y="203200"/>
+            <a:ext cx="3873500" cy="3873500"/>
+          </a:xfrm>
+          <a:prstGeom prst="rect">
+            <a:avLst/>
+          </a:prstGeom>
+          <a:noFill/>
+          <a:ln w="9525">
+            <a:noFill/>
+            <a:headEnd/>
+            <a:tailEnd/>
+          </a:ln>
+        </p:spPr>
+      </p:pic>
+      <p:sp>
+        <p:nvSpPr>
+          <p:cNvPr id="1" name="TextBox 3"/>
+          <p:cNvSpPr txBox="1"/>
+          <p:nvPr/>
+        </p:nvSpPr>
+        <p:spPr>
+          <a:xfrm>
+            <a:off x="3568700" y="4076700"/>
+            <a:ext cx="5105400" cy="508000"/>
+          </a:xfrm>
+          <a:prstGeom prst="rect">
+            <a:avLst/>
+          </a:prstGeom>
+          <a:noFill/>
+        </p:spPr>
+        <p:txBody>
+          <a:bodyPr/>
+          <a:lstStyle/>
+          <a:p>
+            <a:pPr lvl="0" indent="0" marL="0" algn="ctr">
+              <a:buNone/>
+            </a:pPr>
+            <a:r>
+              <a:rPr/>
+              <a:t>Image</a:t>
+            </a:r>
+          </a:p>
+        </p:txBody>
+      </p:sp>
+    </p:spTree>
+  </p:cSld>
+</p:sld>
+</file>
+
+<file path=ppt/slides/slide13.xml><?xml version="1.0" encoding="utf-8"?>
 <p:sld xmlns:a="http://schemas.openxmlformats.org/drawingml/2006/main" xmlns:r="http://schemas.openxmlformats.org/officeDocument/2006/relationships" xmlns:p="http://schemas.openxmlformats.org/presentationml/2006/main">
   <p:cSld>
     <p:spTree>
@@ -3617,155 +3724,6 @@
 </p:sld>
 </file>
 
-<file path=ppt/slides/slide13.xml><?xml version="1.0" encoding="utf-8"?>
-<p:sld xmlns:a="http://schemas.openxmlformats.org/drawingml/2006/main" xmlns:r="http://schemas.openxmlformats.org/officeDocument/2006/relationships" xmlns:p="http://schemas.openxmlformats.org/presentationml/2006/main">
-  <p:cSld>
-    <p:spTree>
-      <p:nvGrpSpPr>
-        <p:cNvPr id="1" name=""/>
-        <p:cNvGrpSpPr/>
-        <p:nvPr/>
-      </p:nvGrpSpPr>
-      <p:grpSpPr>
-        <a:xfrm>
-          <a:off x="0" y="0"/>
-          <a:ext cx="0" cy="0"/>
-          <a:chOff x="0" y="0"/>
-          <a:chExt cx="0" cy="0"/>
-        </a:xfrm>
-      </p:grpSpPr>
-      <p:sp>
-        <p:nvSpPr>
-          <p:cNvPr id="3" name="Content Placeholder 2"/>
-          <p:cNvSpPr>
-            <a:spLocks noGrp="1"/>
-          </p:cNvSpPr>
-          <p:nvPr>
-            <p:ph idx="1"/>
-          </p:nvPr>
-        </p:nvSpPr>
-        <p:spPr/>
-        <p:txBody>
-          <a:bodyPr/>
-          <a:lstStyle/>
-          <a:p>
-            <a:pPr lvl="0" indent="0" marL="0">
-              <a:spcBef>
-                <a:spcPts val="3000"/>
-              </a:spcBef>
-              <a:buNone/>
-            </a:pPr>
-            <a:r>
-              <a:rPr b="1"/>
-              <a:t>What’s the “research question” of the Literature Review</a:t>
-            </a:r>
-          </a:p>
-          <a:p>
-            <a:pPr lvl="0"/>
-            <a:r>
-              <a:rPr/>
-              <a:t>What’s the gap in the literature? (should eventually coincide with the research question)</a:t>
-            </a:r>
-          </a:p>
-          <a:p>
-            <a:pPr lvl="1"/>
-            <a:r>
-              <a:rPr/>
-              <a:t>What are you </a:t>
-            </a:r>
-            <a:r>
-              <a:rPr i="1"/>
-              <a:t>arguing</a:t>
-            </a:r>
-            <a:r>
-              <a:rPr/>
-              <a:t>? That this gap exists… (perhaps other things too)</a:t>
-            </a:r>
-          </a:p>
-          <a:p>
-            <a:pPr lvl="0"/>
-            <a:r>
-              <a:rPr/>
-              <a:t>Develop a </a:t>
-            </a:r>
-            <a:r>
-              <a:rPr i="1"/>
-              <a:t>Methodology</a:t>
-            </a:r>
-            <a:r>
-              <a:rPr/>
-              <a:t>:</a:t>
-            </a:r>
-          </a:p>
-          <a:p>
-            <a:pPr lvl="1"/>
-            <a:r>
-              <a:rPr/>
-              <a:t>Choose relevant search terms (think about AI’s ability to translate the terms you think of to the ones you don’t)</a:t>
-            </a:r>
-          </a:p>
-          <a:p>
-            <a:pPr lvl="2"/>
-            <a:r>
-              <a:rPr/>
-              <a:t>Pick a couple of relevant articles and read the references</a:t>
-            </a:r>
-          </a:p>
-          <a:p>
-            <a:pPr lvl="1"/>
-            <a:r>
-              <a:rPr/>
-              <a:t>Choose an organization principles:</a:t>
-            </a:r>
-          </a:p>
-          <a:p>
-            <a:pPr lvl="2"/>
-            <a:r>
-              <a:rPr/>
-              <a:t>Organize by theme? What are the themes?</a:t>
-            </a:r>
-          </a:p>
-          <a:p>
-            <a:pPr lvl="2"/>
-            <a:r>
-              <a:rPr/>
-              <a:t>Organize by time? How have debates on topic X </a:t>
-            </a:r>
-            <a:r>
-              <a:rPr i="1"/>
-              <a:t>evolved</a:t>
-            </a:r>
-            <a:r>
-              <a:rPr/>
-              <a:t>?</a:t>
-            </a:r>
-          </a:p>
-          <a:p>
-            <a:pPr lvl="0"/>
-            <a:r>
-              <a:rPr/>
-              <a:t>Construct an </a:t>
-            </a:r>
-            <a:r>
-              <a:rPr i="1"/>
-              <a:t>Introduction</a:t>
-            </a:r>
-            <a:r>
-              <a:rPr/>
-              <a:t> and </a:t>
-            </a:r>
-            <a:r>
-              <a:rPr i="1"/>
-              <a:t>Conclusion</a:t>
-            </a:r>
-          </a:p>
-        </p:txBody>
-      </p:sp>
-    </p:spTree>
-  </p:cSld>
-</p:sld>
-</file>
-
 <file path=ppt/slides/slide14.xml><?xml version="1.0" encoding="utf-8"?>
 <p:sld xmlns:a="http://schemas.openxmlformats.org/drawingml/2006/main" xmlns:r="http://schemas.openxmlformats.org/officeDocument/2006/relationships" xmlns:p="http://schemas.openxmlformats.org/presentationml/2006/main">
   <p:cSld>
@@ -3785,6 +3743,31 @@
       </p:grpSpPr>
       <p:sp>
         <p:nvSpPr>
+          <p:cNvPr id="2" name="Title 1"/>
+          <p:cNvSpPr>
+            <a:spLocks noGrp="1"/>
+          </p:cNvSpPr>
+          <p:nvPr>
+            <p:ph type="title"/>
+          </p:nvPr>
+        </p:nvSpPr>
+        <p:spPr/>
+        <p:txBody>
+          <a:bodyPr/>
+          <a:lstStyle/>
+          <a:p>
+            <a:pPr lvl="0" indent="0" marL="0">
+              <a:buNone/>
+            </a:pPr>
+            <a:r>
+              <a:rPr/>
+              <a:t>Hour 2 (might get here early)…</a:t>
+            </a:r>
+          </a:p>
+        </p:txBody>
+      </p:sp>
+      <p:sp>
+        <p:nvSpPr>
           <p:cNvPr id="3" name="Content Placeholder 2"/>
           <p:cNvSpPr>
             <a:spLocks noGrp="1"/>
@@ -3806,168 +3789,7 @@
             </a:pPr>
             <a:r>
               <a:rPr b="1"/>
-              <a:t>Metaphors of Knowledge: Navigating fields and finding gaps</a:t>
-            </a:r>
-          </a:p>
-          <a:p>
-            <a:pPr lvl="0"/>
-            <a:r>
-              <a:rPr/>
-              <a:t>What is the </a:t>
-            </a:r>
-            <a:r>
-              <a:rPr b="1"/>
-              <a:t>field</a:t>
-            </a:r>
-            <a:r>
-              <a:rPr/>
-              <a:t>? Talk your reader through it…</a:t>
-            </a:r>
-          </a:p>
-          <a:p>
-            <a:pPr lvl="0"/>
-            <a:r>
-              <a:rPr/>
-              <a:t>What is the </a:t>
-            </a:r>
-            <a:r>
-              <a:rPr b="1"/>
-              <a:t>gap</a:t>
-            </a:r>
-            <a:r>
-              <a:rPr/>
-              <a:t>? Tell your reader how you get there…</a:t>
-            </a:r>
-          </a:p>
-          <a:p>
-            <a:pPr lvl="1"/>
-            <a:r>
-              <a:rPr/>
-              <a:t>work backwards - find the gap, </a:t>
-            </a:r>
-            <a:r>
-              <a:rPr i="1"/>
-              <a:t>then</a:t>
-            </a:r>
-            <a:r>
-              <a:rPr/>
-              <a:t> organize the steps…</a:t>
-            </a:r>
-          </a:p>
-          <a:p>
-            <a:pPr lvl="0"/>
-            <a:r>
-              <a:rPr/>
-              <a:t>Use the language of </a:t>
-            </a:r>
-            <a:r>
-              <a:rPr i="1"/>
-              <a:t>argument</a:t>
-            </a:r>
-            <a:r>
-              <a:rPr/>
-              <a:t> / </a:t>
-            </a:r>
-            <a:r>
-              <a:rPr i="1"/>
-              <a:t>metadiscourse</a:t>
-            </a:r>
-            <a:r>
-              <a:rPr/>
-              <a:t>:</a:t>
-            </a:r>
-          </a:p>
-          <a:p>
-            <a:pPr lvl="1"/>
-            <a:r>
-              <a:rPr/>
-              <a:t>If we are on a “path” through the “field”, join the dots:</a:t>
-            </a:r>
-          </a:p>
-          <a:p>
-            <a:pPr lvl="2"/>
-            <a:r>
-              <a:rPr/>
-              <a:t>Move up / down: general - specific</a:t>
-            </a:r>
-          </a:p>
-          <a:p>
-            <a:pPr lvl="3"/>
-            <a:r>
-              <a:rPr/>
-              <a:t>“More generally…”, “At an abstract level”, “Theoretically…”, “Globally / Nationally…”</a:t>
-            </a:r>
-          </a:p>
-          <a:p>
-            <a:pPr lvl="3"/>
-            <a:r>
-              <a:rPr/>
-              <a:t>“More specifically…”, “At an concrete level”, “Pratically”, “Locally</a:t>
-            </a:r>
-          </a:p>
-          <a:p>
-            <a:pPr lvl="2"/>
-            <a:r>
-              <a:rPr/>
-              <a:t>Move side to side: similar - different</a:t>
-            </a:r>
-          </a:p>
-          <a:p>
-            <a:pPr lvl="3"/>
-            <a:r>
-              <a:rPr/>
-              <a:t>“Similarly…”, “Along the same lines…”,</a:t>
-            </a:r>
-          </a:p>
-          <a:p>
-            <a:pPr lvl="3"/>
-            <a:r>
-              <a:rPr/>
-              <a:t>“However…”, “Conversely…”, “On the other hand…”, “In contrast…”</a:t>
-            </a:r>
-          </a:p>
-          <a:p>
-            <a:pPr lvl="1"/>
-            <a:r>
-              <a:rPr/>
-              <a:t>“Control” your navigation:</a:t>
-            </a:r>
-          </a:p>
-          <a:p>
-            <a:pPr lvl="2"/>
-            <a:r>
-              <a:rPr/>
-              <a:t>“This review </a:t>
-            </a:r>
-            <a:r>
-              <a:rPr i="1"/>
-              <a:t>will</a:t>
-            </a:r>
-            <a:r>
-              <a:rPr/>
-              <a:t> cover…”, “The literature describes several facets of…”</a:t>
-            </a:r>
-          </a:p>
-          <a:p>
-            <a:pPr lvl="2"/>
-            <a:r>
-              <a:rPr/>
-              <a:t>Add some drama: “Meanwhile…”, “Despite…”, “X has dispute Y’s findings…”</a:t>
-            </a:r>
-          </a:p>
-          <a:p>
-            <a:pPr lvl="2"/>
-            <a:r>
-              <a:rPr/>
-              <a:t>“This review </a:t>
-            </a:r>
-            <a:r>
-              <a:rPr i="1"/>
-              <a:t>has</a:t>
-            </a:r>
-            <a:r>
-              <a:rPr/>
-              <a:t> covered…”</a:t>
+              <a:t>Mapping Fields and Minding Gaps</a:t>
             </a:r>
           </a:p>
         </p:txBody>
@@ -4017,53 +3839,106 @@
             </a:pPr>
             <a:r>
               <a:rPr b="1"/>
-              <a:t>Work it like a Puzzle</a:t>
+              <a:t>What’s the “research question” of the Literature Review</a:t>
             </a:r>
           </a:p>
           <a:p>
             <a:pPr lvl="0"/>
             <a:r>
               <a:rPr/>
-              <a:t>Look at the whole picture - does it make sense?</a:t>
+              <a:t>What’s the gap in the literature? (should eventually coincide with the research question)</a:t>
+            </a:r>
+          </a:p>
+          <a:p>
+            <a:pPr lvl="1"/>
+            <a:r>
+              <a:rPr/>
+              <a:t>What are you </a:t>
+            </a:r>
+            <a:r>
+              <a:rPr i="1"/>
+              <a:t>arguing</a:t>
+            </a:r>
+            <a:r>
+              <a:rPr/>
+              <a:t>? That this gap exists… (perhaps other things too)</a:t>
             </a:r>
           </a:p>
           <a:p>
             <a:pPr lvl="0"/>
             <a:r>
               <a:rPr/>
-              <a:t>Fill it in piece by piece</a:t>
+              <a:t>Develop a </a:t>
+            </a:r>
+            <a:r>
+              <a:rPr i="1"/>
+              <a:t>Methodology</a:t>
+            </a:r>
+            <a:r>
+              <a:rPr/>
+              <a:t>:</a:t>
+            </a:r>
+          </a:p>
+          <a:p>
+            <a:pPr lvl="1"/>
+            <a:r>
+              <a:rPr/>
+              <a:t>Choose relevant search terms (think about AI’s ability to translate the terms you think of to the ones you don’t)</a:t>
+            </a:r>
+          </a:p>
+          <a:p>
+            <a:pPr lvl="2"/>
+            <a:r>
+              <a:rPr/>
+              <a:t>Pick a couple of relevant articles and read the references</a:t>
+            </a:r>
+          </a:p>
+          <a:p>
+            <a:pPr lvl="1"/>
+            <a:r>
+              <a:rPr/>
+              <a:t>Choose an organization principles:</a:t>
+            </a:r>
+          </a:p>
+          <a:p>
+            <a:pPr lvl="2"/>
+            <a:r>
+              <a:rPr/>
+              <a:t>Organize by theme? What are the themes?</a:t>
+            </a:r>
+          </a:p>
+          <a:p>
+            <a:pPr lvl="2"/>
+            <a:r>
+              <a:rPr/>
+              <a:t>Organize by time? How have debates on topic X </a:t>
+            </a:r>
+            <a:r>
+              <a:rPr i="1"/>
+              <a:t>evolved</a:t>
+            </a:r>
+            <a:r>
+              <a:rPr/>
+              <a:t>?</a:t>
             </a:r>
           </a:p>
           <a:p>
             <a:pPr lvl="0"/>
             <a:r>
               <a:rPr/>
-              <a:t>Iterate - whole to part, part to whole</a:t>
-            </a:r>
-          </a:p>
-          <a:p>
-            <a:pPr lvl="0"/>
-            <a:r>
-              <a:rPr/>
-              <a:t>More vocabularly: the </a:t>
+              <a:t>Construct an </a:t>
             </a:r>
             <a:r>
               <a:rPr i="1"/>
-              <a:t>Hermeneutic Circle</a:t>
-            </a:r>
-          </a:p>
-          <a:p>
-            <a:pPr lvl="1"/>
-            <a:r>
-              <a:rPr/>
-              <a:t>Understand the Whole (in order to Interpret the Path)</a:t>
-            </a:r>
-          </a:p>
-          <a:p>
-            <a:pPr lvl="1"/>
-            <a:r>
-              <a:rPr/>
-              <a:t>Interpret the Path (in order to Understanding the Whole)</a:t>
+              <a:t>Introduction</a:t>
+            </a:r>
+            <a:r>
+              <a:rPr/>
+              <a:t> and </a:t>
+            </a:r>
+            <a:r>
+              <a:rPr i="1"/>
+              <a:t>Conclusion</a:t>
             </a:r>
           </a:p>
         </p:txBody>
@@ -4113,42 +3988,168 @@
             </a:pPr>
             <a:r>
               <a:rPr b="1"/>
-              <a:t>Common Pitfalls</a:t>
+              <a:t>Metaphors of Knowledge: Navigating fields and finding gaps</a:t>
             </a:r>
           </a:p>
           <a:p>
             <a:pPr lvl="0"/>
             <a:r>
               <a:rPr/>
-              <a:t>The Annotated Bibliography and the Literature Review</a:t>
+              <a:t>What is the </a:t>
+            </a:r>
+            <a:r>
+              <a:rPr b="1"/>
+              <a:t>field</a:t>
+            </a:r>
+            <a:r>
+              <a:rPr/>
+              <a:t>? Talk your reader through it…</a:t>
             </a:r>
           </a:p>
           <a:p>
             <a:pPr lvl="0"/>
             <a:r>
               <a:rPr/>
-              <a:t>Tone: Navigating The Two Cultures (see Snow 1959)</a:t>
+              <a:t>What is the </a:t>
+            </a:r>
+            <a:r>
+              <a:rPr b="1"/>
+              <a:t>gap</a:t>
+            </a:r>
+            <a:r>
+              <a:rPr/>
+              <a:t>? Tell your reader how you get there…</a:t>
+            </a:r>
+          </a:p>
+          <a:p>
+            <a:pPr lvl="1"/>
+            <a:r>
+              <a:rPr/>
+              <a:t>work backwards - find the gap, </a:t>
+            </a:r>
+            <a:r>
+              <a:rPr i="1"/>
+              <a:t>then</a:t>
+            </a:r>
+            <a:r>
+              <a:rPr/>
+              <a:t> organize the steps…</a:t>
             </a:r>
           </a:p>
           <a:p>
             <a:pPr lvl="0"/>
             <a:r>
               <a:rPr/>
-              <a:t>Lack of Signposting / metadiscourse / discourse markers / rhetorical statements</a:t>
-            </a:r>
-          </a:p>
-          <a:p>
-            <a:pPr lvl="0"/>
-            <a:r>
-              <a:rPr/>
-              <a:t>Lack of persuasive purpose</a:t>
-            </a:r>
-          </a:p>
-          <a:p>
-            <a:pPr lvl="0"/>
-            <a:r>
-              <a:rPr/>
-              <a:t>Laundry list of gaps -&gt; Narrow down on the one / two that you are likely to follow</a:t>
+              <a:t>Use the language of </a:t>
+            </a:r>
+            <a:r>
+              <a:rPr i="1"/>
+              <a:t>argument</a:t>
+            </a:r>
+            <a:r>
+              <a:rPr/>
+              <a:t> / </a:t>
+            </a:r>
+            <a:r>
+              <a:rPr i="1"/>
+              <a:t>metadiscourse</a:t>
+            </a:r>
+            <a:r>
+              <a:rPr/>
+              <a:t>:</a:t>
+            </a:r>
+          </a:p>
+          <a:p>
+            <a:pPr lvl="1"/>
+            <a:r>
+              <a:rPr/>
+              <a:t>If we are on a “path” through the “field”, join the dots:</a:t>
+            </a:r>
+          </a:p>
+          <a:p>
+            <a:pPr lvl="2"/>
+            <a:r>
+              <a:rPr/>
+              <a:t>Move up / down: general - specific</a:t>
+            </a:r>
+          </a:p>
+          <a:p>
+            <a:pPr lvl="3"/>
+            <a:r>
+              <a:rPr/>
+              <a:t>“More generally…”, “At an abstract level”, “Theoretically…”, “Globally / Nationally…”</a:t>
+            </a:r>
+          </a:p>
+          <a:p>
+            <a:pPr lvl="3"/>
+            <a:r>
+              <a:rPr/>
+              <a:t>“More specifically…”, “At an concrete level”, “Pratically”, “Locally</a:t>
+            </a:r>
+          </a:p>
+          <a:p>
+            <a:pPr lvl="2"/>
+            <a:r>
+              <a:rPr/>
+              <a:t>Move side to side: similar - different</a:t>
+            </a:r>
+          </a:p>
+          <a:p>
+            <a:pPr lvl="3"/>
+            <a:r>
+              <a:rPr/>
+              <a:t>“Similarly…”, “Along the same lines…”,</a:t>
+            </a:r>
+          </a:p>
+          <a:p>
+            <a:pPr lvl="3"/>
+            <a:r>
+              <a:rPr/>
+              <a:t>“However…”, “Conversely…”, “On the other hand…”, “In contrast…”</a:t>
+            </a:r>
+          </a:p>
+          <a:p>
+            <a:pPr lvl="1"/>
+            <a:r>
+              <a:rPr/>
+              <a:t>“Control” your navigation:</a:t>
+            </a:r>
+          </a:p>
+          <a:p>
+            <a:pPr lvl="2"/>
+            <a:r>
+              <a:rPr/>
+              <a:t>“This review </a:t>
+            </a:r>
+            <a:r>
+              <a:rPr i="1"/>
+              <a:t>will</a:t>
+            </a:r>
+            <a:r>
+              <a:rPr/>
+              <a:t> cover…”, “The literature describes several facets of…”</a:t>
+            </a:r>
+          </a:p>
+          <a:p>
+            <a:pPr lvl="2"/>
+            <a:r>
+              <a:rPr/>
+              <a:t>Add some drama: “Meanwhile…”, “Despite…”, “X has dispute Y’s findings…”</a:t>
+            </a:r>
+          </a:p>
+          <a:p>
+            <a:pPr lvl="2"/>
+            <a:r>
+              <a:rPr/>
+              <a:t>“This review </a:t>
+            </a:r>
+            <a:r>
+              <a:rPr i="1"/>
+              <a:t>has</a:t>
+            </a:r>
+            <a:r>
+              <a:rPr/>
+              <a:t> covered…”</a:t>
             </a:r>
           </a:p>
         </p:txBody>
@@ -4198,46 +4199,53 @@
             </a:pPr>
             <a:r>
               <a:rPr b="1"/>
-              <a:t>Two (or Three) (Pseudo-)Random Articles</a:t>
-            </a:r>
-          </a:p>
-          <a:p>
-            <a:pPr lvl="0" indent="-342900" marL="342900">
-              <a:buAutoNum type="arabicPeriod"/>
-            </a:pPr>
-            <a:r>
-              <a:rPr/>
-              <a:t>Keerthiraj, &amp; Misra, A. (2025). Who owns the future? AI, digital sovereignty, and the politics of knowledge. AI &amp; SOCIETY, 1-13. https://link.springer.com/article/10.1007/s00146-025-02641-y</a:t>
-            </a:r>
-            <a:br/>
-          </a:p>
-          <a:p>
-            <a:pPr lvl="0" indent="-342900" marL="342900">
-              <a:buAutoNum type="arabicPeriod"/>
-            </a:pPr>
-            <a:r>
-              <a:rPr/>
-              <a:t>Liu, J., Zhang, Y., Li, W., Wang, Q., Niu, P., &amp; Zhang, X. (2025). Adaptive vs. Planned Metacognitive Scaffolding for Computational Thinking: Evidence from Generative AI-Supported Programming in Elementary Education. Computers &amp; Education, 105473. https://www.sciencedirect.com/science/article/pii/S0360131525002416?casa_token=cBNpQ0r7f4oAAAAA:THnluE0eVY1uTJ3bnp1V6j-fsLEXobOB6QqoszFx_hsNacpAVPMmIe61gO70IXtFPiT2vIRcGPk</a:t>
-            </a:r>
-          </a:p>
-          <a:p>
-            <a:pPr lvl="0" indent="-342900" marL="342900">
-              <a:buAutoNum type="arabicPeriod"/>
-            </a:pPr>
-            <a:r>
-              <a:rPr/>
-              <a:t>Spivak, G. C. (2023). Can the subaltern speak?. In Imperialism (pp. 171-219). Routledge. http://users.uoa.gr/~cdokou/TheoryCriticismTexts/Spivak-Subaltern.pdf</a:t>
+              <a:t>Work it like a Puzzle</a:t>
             </a:r>
           </a:p>
           <a:p>
             <a:pPr lvl="0"/>
             <a:r>
               <a:rPr/>
-              <a:t>Why these two (three) examples? Contrasting methods, yes - but more than this, these articles reflect different orientations towards </a:t>
+              <a:t>Look at the whole picture - does it make sense?</a:t>
+            </a:r>
+          </a:p>
+          <a:p>
+            <a:pPr lvl="0"/>
+            <a:r>
+              <a:rPr/>
+              <a:t>Fill it in piece by piece</a:t>
+            </a:r>
+          </a:p>
+          <a:p>
+            <a:pPr lvl="0"/>
+            <a:r>
+              <a:rPr/>
+              <a:t>Iterate - whole to part, part to whole</a:t>
+            </a:r>
+          </a:p>
+          <a:p>
+            <a:pPr lvl="0"/>
+            <a:r>
+              <a:rPr/>
+              <a:t>More vocabularly: the </a:t>
             </a:r>
             <a:r>
               <a:rPr i="1"/>
-              <a:t>scholarly techniques of persuasion</a:t>
+              <a:t>Hermeneutic Circle</a:t>
+            </a:r>
+          </a:p>
+          <a:p>
+            <a:pPr lvl="1"/>
+            <a:r>
+              <a:rPr/>
+              <a:t>Understand the Whole (in order to Interpret the Path)</a:t>
+            </a:r>
+          </a:p>
+          <a:p>
+            <a:pPr lvl="1"/>
+            <a:r>
+              <a:rPr/>
+              <a:t>Interpret the Path (in order to Understanding the Whole)</a:t>
             </a:r>
           </a:p>
         </p:txBody>
@@ -4287,74 +4295,42 @@
             </a:pPr>
             <a:r>
               <a:rPr b="1"/>
-              <a:t>First: What do we do when we open an article?</a:t>
+              <a:t>Common Pitfalls</a:t>
             </a:r>
           </a:p>
           <a:p>
             <a:pPr lvl="0"/>
             <a:r>
               <a:rPr/>
-              <a:t>What are the different ways of reading?</a:t>
+              <a:t>The Annotated Bibliography and the Literature Review</a:t>
             </a:r>
           </a:p>
           <a:p>
             <a:pPr lvl="0"/>
             <a:r>
               <a:rPr/>
-              <a:t>2 Common Strategies:</a:t>
-            </a:r>
-          </a:p>
-          <a:p>
-            <a:pPr lvl="1"/>
-            <a:r>
-              <a:rPr/>
-              <a:t>Top to bottom</a:t>
-            </a:r>
-          </a:p>
-          <a:p>
-            <a:pPr lvl="1"/>
-            <a:r>
-              <a:rPr/>
-              <a:t>Abstract, Introduction, Conclusion - then the rest</a:t>
+              <a:t>Tone: Navigating The Two Cultures (see Snow 1959)</a:t>
             </a:r>
           </a:p>
           <a:p>
             <a:pPr lvl="0"/>
             <a:r>
               <a:rPr/>
-              <a:t>Sometimes:</a:t>
-            </a:r>
-          </a:p>
-          <a:p>
-            <a:pPr lvl="1"/>
-            <a:r>
-              <a:rPr/>
-              <a:t>Literature Review first</a:t>
-            </a:r>
-          </a:p>
-          <a:p>
-            <a:pPr lvl="1"/>
-            <a:r>
-              <a:rPr/>
-              <a:t>Methodology first (what did the researchers do?)</a:t>
-            </a:r>
-          </a:p>
-          <a:p>
-            <a:pPr lvl="1"/>
-            <a:r>
-              <a:rPr/>
-              <a:t>References first (what “space” of academia does this belong in?)</a:t>
-            </a:r>
-          </a:p>
-          <a:p>
-            <a:pPr lvl="0" indent="0" marL="0">
-              <a:buNone/>
-            </a:pPr>
-            <a:r>
-              <a:rPr>
-                <a:hlinkClick r:id="rId2"/>
-              </a:rPr>
-              <a:t>ERAM 590 - Google Docs</a:t>
+              <a:t>Lack of Signposting / metadiscourse / discourse markers / rhetorical statements</a:t>
+            </a:r>
+          </a:p>
+          <a:p>
+            <a:pPr lvl="0"/>
+            <a:r>
+              <a:rPr/>
+              <a:t>Lack of persuasive purpose</a:t>
+            </a:r>
+          </a:p>
+          <a:p>
+            <a:pPr lvl="0"/>
+            <a:r>
+              <a:rPr/>
+              <a:t>Laundry list of gaps -&gt; Narrow down on the one / two that you are likely to follow</a:t>
             </a:r>
           </a:p>
         </p:txBody>
@@ -4404,20 +4380,56 @@
             </a:pPr>
             <a:r>
               <a:rPr b="1"/>
-              <a:t>Who owns the future? AI, digital sovereignty, and the politics of knowledge </a:t>
-            </a:r>
-            <a:r>
-              <a:rPr b="1" i="1"/>
-              <a:t>Keerthiraj, &amp; Misra, A. (2025)</a:t>
-            </a:r>
-          </a:p>
-          <a:p>
-            <a:pPr lvl="0" indent="0" marL="0">
-              <a:buNone/>
-            </a:pPr>
-            <a:r>
-              <a:rPr/>
-              <a:t>Keerthiraj, &amp; Misra, A. (2025). Who owns the future? AI, digital sovereignty, and the politics of knowledge. AI &amp; SOCIETY, 1-13. https://link.springer.com/article/10.1007/s00146-025-02641-y</a:t>
+              <a:t>More on tone…</a:t>
+            </a:r>
+          </a:p>
+          <a:p>
+            <a:pPr lvl="0"/>
+            <a:r>
+              <a:rPr/>
+              <a:t>Tone: Navigating The Two Cultures (see Snow 1959)</a:t>
+            </a:r>
+          </a:p>
+          <a:p>
+            <a:pPr lvl="0"/>
+            <a:r>
+              <a:rPr/>
+              <a:t>Scientist / Quantitative / Positivist</a:t>
+            </a:r>
+          </a:p>
+          <a:p>
+            <a:pPr lvl="1"/>
+            <a:r>
+              <a:rPr/>
+              <a:t>Lots of 3rd person / passive voice (“It was observed that…”) - But note, this is changing</a:t>
+            </a:r>
+          </a:p>
+          <a:p>
+            <a:pPr lvl="0"/>
+            <a:r>
+              <a:rPr/>
+              <a:t>Humanist / Qualitative / Post-positivist or Interpretivist or Constuctivist</a:t>
+            </a:r>
+          </a:p>
+          <a:p>
+            <a:pPr lvl="1"/>
+            <a:r>
+              <a:rPr/>
+              <a:t>More 1st person / active voice (“We noticed that”)</a:t>
+            </a:r>
+          </a:p>
+          <a:p>
+            <a:pPr lvl="0"/>
+            <a:r>
+              <a:rPr/>
+              <a:t>In the field of education, both “cultures” co-exist (sometimes even peacefully)</a:t>
+            </a:r>
+          </a:p>
+          <a:p>
+            <a:pPr lvl="0"/>
+            <a:r>
+              <a:rPr/>
+              <a:t>How do you decide on your tone?</a:t>
             </a:r>
           </a:p>
         </p:txBody>
@@ -4576,16 +4588,46 @@
             </a:pPr>
             <a:r>
               <a:rPr b="1"/>
-              <a:t>Adaptive vs. Planned Metacognitive Scaffolding for Computational Thinking</a:t>
+              <a:t>Two (or Three) (Pseudo-)Random Articles</a:t>
             </a:r>
           </a:p>
           <a:p>
             <a:pPr lvl="0" indent="-342900" marL="342900">
-              <a:buAutoNum startAt="2" type="arabicPeriod"/>
+              <a:buAutoNum type="arabicPeriod"/>
             </a:pPr>
             <a:r>
               <a:rPr/>
+              <a:t>Keerthiraj, &amp; Misra, A. (2025). Who owns the future? AI, digital sovereignty, and the politics of knowledge. AI &amp; SOCIETY, 1-13. https://link.springer.com/article/10.1007/s00146-025-02641-y</a:t>
+            </a:r>
+            <a:br/>
+          </a:p>
+          <a:p>
+            <a:pPr lvl="0" indent="-342900" marL="342900">
+              <a:buAutoNum type="arabicPeriod"/>
+            </a:pPr>
+            <a:r>
+              <a:rPr/>
               <a:t>Liu, J., Zhang, Y., Li, W., Wang, Q., Niu, P., &amp; Zhang, X. (2025). Adaptive vs. Planned Metacognitive Scaffolding for Computational Thinking: Evidence from Generative AI-Supported Programming in Elementary Education. Computers &amp; Education, 105473. https://www.sciencedirect.com/science/article/pii/S0360131525002416?casa_token=cBNpQ0r7f4oAAAAA:THnluE0eVY1uTJ3bnp1V6j-fsLEXobOB6QqoszFx_hsNacpAVPMmIe61gO70IXtFPiT2vIRcGPk</a:t>
+            </a:r>
+          </a:p>
+          <a:p>
+            <a:pPr lvl="0" indent="-342900" marL="342900">
+              <a:buAutoNum type="arabicPeriod"/>
+            </a:pPr>
+            <a:r>
+              <a:rPr/>
+              <a:t>Spivak, G. C. (2023). Can the subaltern speak?. In Imperialism (pp. 171-219). Routledge. http://users.uoa.gr/~cdokou/TheoryCriticismTexts/Spivak-Subaltern.pdf</a:t>
+            </a:r>
+          </a:p>
+          <a:p>
+            <a:pPr lvl="0"/>
+            <a:r>
+              <a:rPr/>
+              <a:t>Why these two (three) examples? Contrasting methods, yes - but more than this, these articles reflect different orientations towards </a:t>
+            </a:r>
+            <a:r>
+              <a:rPr i="1"/>
+              <a:t>scholarly techniques of persuasion</a:t>
             </a:r>
           </a:p>
         </p:txBody>
@@ -4635,7 +4677,63 @@
             </a:pPr>
             <a:r>
               <a:rPr b="1"/>
-              <a:t>Can the subaltern speak?</a:t>
+              <a:t>First: What do we do when we open an article?</a:t>
+            </a:r>
+          </a:p>
+          <a:p>
+            <a:pPr lvl="0"/>
+            <a:r>
+              <a:rPr/>
+              <a:t>What are the different ways of reading?</a:t>
+            </a:r>
+          </a:p>
+          <a:p>
+            <a:pPr lvl="0"/>
+            <a:r>
+              <a:rPr/>
+              <a:t>2 Common Strategies:</a:t>
+            </a:r>
+          </a:p>
+          <a:p>
+            <a:pPr lvl="1"/>
+            <a:r>
+              <a:rPr/>
+              <a:t>Top to bottom</a:t>
+            </a:r>
+          </a:p>
+          <a:p>
+            <a:pPr lvl="1"/>
+            <a:r>
+              <a:rPr/>
+              <a:t>Abstract, Introduction, Conclusion - then the rest</a:t>
+            </a:r>
+          </a:p>
+          <a:p>
+            <a:pPr lvl="0"/>
+            <a:r>
+              <a:rPr/>
+              <a:t>Sometimes:</a:t>
+            </a:r>
+          </a:p>
+          <a:p>
+            <a:pPr lvl="1"/>
+            <a:r>
+              <a:rPr/>
+              <a:t>Literature Review first</a:t>
+            </a:r>
+          </a:p>
+          <a:p>
+            <a:pPr lvl="1"/>
+            <a:r>
+              <a:rPr/>
+              <a:t>Methodology first (what did the researchers do?)</a:t>
+            </a:r>
+          </a:p>
+          <a:p>
+            <a:pPr lvl="1"/>
+            <a:r>
+              <a:rPr/>
+              <a:t>References first (what “space” of academia does this belong in?)</a:t>
             </a:r>
           </a:p>
           <a:p>
@@ -4644,7 +4742,18 @@
             </a:pPr>
             <a:r>
               <a:rPr/>
-              <a:t>Spivak, G. C. (2023). Can the subaltern speak?. In Imperialism (pp. 171-219). Routledge. http://users.uoa.gr/~cdokou/TheoryCriticismTexts/Spivak-Subaltern.pdf</a:t>
+              <a:t>Other ideas?</a:t>
+            </a:r>
+          </a:p>
+          <a:p>
+            <a:pPr lvl="0" indent="0" marL="0">
+              <a:buNone/>
+            </a:pPr>
+            <a:r>
+              <a:rPr>
+                <a:hlinkClick r:id="rId2"/>
+              </a:rPr>
+              <a:t>ERAM 590 - Google Docs</a:t>
             </a:r>
           </a:p>
         </p:txBody>
@@ -4694,7 +4803,11 @@
             </a:pPr>
             <a:r>
               <a:rPr b="1"/>
-              <a:t>Designing a Literature Review</a:t>
+              <a:t>Who owns the future? AI, digital sovereignty, and the politics of knowledge </a:t>
+            </a:r>
+            <a:r>
+              <a:rPr b="1" i="1"/>
+              <a:t>Keerthiraj, &amp; Misra, A. (2025)</a:t>
             </a:r>
           </a:p>
           <a:p>
@@ -4703,176 +4816,7 @@
             </a:pPr>
             <a:r>
               <a:rPr/>
-              <a:t>Checklist:</a:t>
-            </a:r>
-          </a:p>
-          <a:p>
-            <a:pPr lvl="0" indent="-342900" marL="342900">
-              <a:buAutoNum type="arabicPeriod"/>
-            </a:pPr>
-            <a:r>
-              <a:rPr/>
-              <a:t>What are the key terms of the (draft) research question? List them…</a:t>
-            </a:r>
-          </a:p>
-          <a:p>
-            <a:pPr lvl="0" indent="-342900" marL="342900">
-              <a:buAutoNum type="arabicPeriod"/>
-            </a:pPr>
-            <a:r>
-              <a:rPr/>
-              <a:t>What are the </a:t>
-            </a:r>
-            <a:r>
-              <a:rPr i="1"/>
-              <a:t>norms</a:t>
-            </a:r>
-            <a:r>
-              <a:rPr/>
-              <a:t> of your field? And what </a:t>
-            </a:r>
-            <a:r>
-              <a:rPr i="1"/>
-              <a:t>is</a:t>
-            </a:r>
-            <a:r>
-              <a:rPr/>
-              <a:t> your field?</a:t>
-            </a:r>
-          </a:p>
-          <a:p>
-            <a:pPr lvl="0" indent="-342900" marL="342900">
-              <a:buAutoNum type="arabicPeriod"/>
-            </a:pPr>
-            <a:r>
-              <a:rPr/>
-              <a:t>What is a reasonable </a:t>
-            </a:r>
-            <a:r>
-              <a:rPr i="1"/>
-              <a:t>method</a:t>
-            </a:r>
-            <a:r>
-              <a:rPr/>
-              <a:t> or </a:t>
-            </a:r>
-            <a:r>
-              <a:rPr i="1"/>
-              <a:t>recipe</a:t>
-            </a:r>
-            <a:r>
-              <a:rPr/>
-              <a:t> for your literature review?</a:t>
-            </a:r>
-          </a:p>
-          <a:p>
-            <a:pPr lvl="0" indent="-342900" marL="342900">
-              <a:buAutoNum type="arabicPeriod"/>
-            </a:pPr>
-            <a:r>
-              <a:rPr/>
-              <a:t>What are </a:t>
-            </a:r>
-            <a:r>
-              <a:rPr i="1"/>
-              <a:t>related terms</a:t>
-            </a:r>
-            <a:r>
-              <a:rPr/>
-              <a:t> (can AI find reasonable synonyms)?</a:t>
-            </a:r>
-          </a:p>
-          <a:p>
-            <a:pPr lvl="0" indent="-342900" marL="342900">
-              <a:buAutoNum type="arabicPeriod"/>
-            </a:pPr>
-            <a:r>
-              <a:rPr/>
-              <a:t>What do you get when you search </a:t>
-            </a:r>
-            <a:r>
-              <a:rPr i="1"/>
-              <a:t>Google Scholar</a:t>
-            </a:r>
-            <a:r>
-              <a:rPr/>
-              <a:t> / </a:t>
-            </a:r>
-            <a:r>
-              <a:rPr i="1"/>
-              <a:t>library databases</a:t>
-            </a:r>
-            <a:r>
-              <a:rPr/>
-              <a:t> for these terms?</a:t>
-            </a:r>
-          </a:p>
-          <a:p>
-            <a:pPr lvl="0" indent="-342900" marL="342900">
-              <a:buAutoNum type="arabicPeriod"/>
-            </a:pPr>
-            <a:r>
-              <a:rPr/>
-              <a:t>Do you have </a:t>
-            </a:r>
-            <a:r>
-              <a:rPr i="1"/>
-              <a:t>existing articles</a:t>
-            </a:r>
-            <a:r>
-              <a:rPr/>
-              <a:t> / authors to draw from?</a:t>
-            </a:r>
-          </a:p>
-          <a:p>
-            <a:pPr lvl="0" indent="-342900" marL="342900">
-              <a:buAutoNum type="arabicPeriod"/>
-            </a:pPr>
-            <a:r>
-              <a:rPr/>
-              <a:t>What </a:t>
-            </a:r>
-            <a:r>
-              <a:rPr i="1"/>
-              <a:t>citation system</a:t>
-            </a:r>
-            <a:r>
-              <a:rPr/>
-              <a:t> are you using? Can you code / organize literature in the way you’d like?</a:t>
-            </a:r>
-          </a:p>
-          <a:p>
-            <a:pPr lvl="0" indent="-342900" marL="342900">
-              <a:buAutoNum type="arabicPeriod"/>
-            </a:pPr>
-            <a:r>
-              <a:rPr/>
-              <a:t>What is the best </a:t>
-            </a:r>
-            <a:r>
-              <a:rPr i="1"/>
-              <a:t>organization</a:t>
-            </a:r>
-            <a:r>
-              <a:rPr/>
-              <a:t> of the literature? Thematic, field (for multi-/interdisciplinary work), chronological, spatial, general / special?</a:t>
-            </a:r>
-          </a:p>
-          <a:p>
-            <a:pPr lvl="0" indent="-342900" marL="342900">
-              <a:buAutoNum type="arabicPeriod"/>
-            </a:pPr>
-            <a:r>
-              <a:rPr/>
-              <a:t>Are there </a:t>
-            </a:r>
-            <a:r>
-              <a:rPr i="1"/>
-              <a:t>classics</a:t>
-            </a:r>
-            <a:r>
-              <a:rPr/>
-              <a:t> you are expected to cite? References with very large number of citations (e.g. Braun &amp; Clarke 2006; Vaswani et al. 2017; Bender et al. 2021)?</a:t>
+              <a:t>Keerthiraj, &amp; Misra, A. (2025). Who owns the future? AI, digital sovereignty, and the politics of knowledge. AI &amp; SOCIETY, 1-13. https://link.springer.com/article/10.1007/s00146-025-02641-y</a:t>
             </a:r>
           </a:p>
         </p:txBody>
@@ -4922,37 +4866,7 @@
             </a:pPr>
             <a:r>
               <a:rPr b="1"/>
-              <a:t>Do some sketches: “fast” review</a:t>
-            </a:r>
-          </a:p>
-          <a:p>
-            <a:pPr lvl="0"/>
-            <a:r>
-              <a:rPr b="1"/>
-              <a:t>Time</a:t>
-            </a:r>
-            <a:r>
-              <a:rPr/>
-              <a:t>, followed by </a:t>
-            </a:r>
-            <a:r>
-              <a:rPr b="1"/>
-              <a:t>theme</a:t>
-            </a:r>
-            <a:r>
-              <a:rPr/>
-              <a:t>, followed by </a:t>
-            </a:r>
-            <a:r>
-              <a:rPr b="1"/>
-              <a:t>space</a:t>
-            </a:r>
-          </a:p>
-          <a:p>
-            <a:pPr lvl="0"/>
-            <a:r>
-              <a:rPr/>
-              <a:t>Just be approximate</a:t>
+              <a:t>Adaptive vs. Planned Metacognitive Scaffolding for Computational Thinking</a:t>
             </a:r>
           </a:p>
           <a:p>
@@ -4961,69 +4875,7 @@
             </a:pPr>
             <a:r>
               <a:rPr/>
-              <a:t>“Criticism of AI </a:t>
-            </a:r>
-            <a:r>
-              <a:rPr b="1"/>
-              <a:t>dates back</a:t>
-            </a:r>
-            <a:r>
-              <a:rPr/>
-              <a:t> to the inception of the field itself. For example, Dreyfus (1966 - or thereabouts) discussed the brittleness of (etc)… By the early 1980s, scepticism voiced by philosophers such as Searle (1981) in his famous”Chinese room” experiment, contributed to the emergence of an AI winter. </a:t>
-            </a:r>
-            <a:r>
-              <a:rPr b="1"/>
-              <a:t>More recently</a:t>
-            </a:r>
-            <a:r>
-              <a:rPr/>
-              <a:t>, as generative AI has largely revived the field, criticism has been directed toward both issues of </a:t>
-            </a:r>
-            <a:r>
-              <a:rPr b="1"/>
-              <a:t>social justice and bias</a:t>
-            </a:r>
-            <a:r>
-              <a:rPr/>
-              <a:t> (e.g. Bender et al. 2021) and potential </a:t>
-            </a:r>
-            <a:r>
-              <a:rPr b="1"/>
-              <a:t>existential risk</a:t>
-            </a:r>
-            <a:r>
-              <a:rPr/>
-              <a:t> (e.g. lesswrong blog). In some cases, critical AI scholars have also argued the existential case is a convenient disguise that obscures more immediate negative social effects (Gebru and Torres 2024). Moreover scholars from </a:t>
-            </a:r>
-            <a:r>
-              <a:rPr b="1"/>
-              <a:t>outside the US</a:t>
-            </a:r>
-            <a:r>
-              <a:rPr/>
-              <a:t> - particularly in the Global South – have begun to argue AI constitutes a form of </a:t>
-            </a:r>
-            <a:r>
-              <a:rPr b="1"/>
-              <a:t>neocolonialism</a:t>
-            </a:r>
-            <a:r>
-              <a:rPr/>
-              <a:t>, impacting digital sovereignty (Keerthiraj, &amp; Misra 2025)”</a:t>
-            </a:r>
-          </a:p>
-          <a:p>
-            <a:pPr lvl="0"/>
-            <a:r>
-              <a:rPr/>
-              <a:t>Can work with or without AI - useful just to test how this or that understanding helps make your case (about gaps)</a:t>
-            </a:r>
-          </a:p>
-          <a:p>
-            <a:pPr lvl="0"/>
-            <a:r>
-              <a:rPr/>
-              <a:t>Don’t commit to this structure just yet!</a:t>
+              <a:t>Liu, J., Zhang, Y., Li, W., Wang, Q., Niu, P., &amp; Zhang, X. (2025). Adaptive vs. Planned Metacognitive Scaffolding for Computational Thinking: Evidence from Generative AI-Supported Programming in Elementary Education. Computers &amp; Education, 105473. https://www.sciencedirect.com/science/article/pii/S0360131525002416?casa_token=cBNpQ0r7f4oAAAAA:THnluE0eVY1uTJ3bnp1V6j-fsLEXobOB6QqoszFx_hsNacpAVPMmIe61gO70IXtFPiT2vIRcGPk</a:t>
             </a:r>
           </a:p>
         </p:txBody>
@@ -5073,76 +4925,16 @@
             </a:pPr>
             <a:r>
               <a:rPr b="1"/>
-              <a:t>Then develop a plan…</a:t>
-            </a:r>
-          </a:p>
-          <a:p>
-            <a:pPr lvl="0" indent="-342900" marL="342900">
-              <a:buAutoNum type="arabicPeriod"/>
+              <a:t>Can the subaltern speak?</a:t>
+            </a:r>
+          </a:p>
+          <a:p>
+            <a:pPr lvl="0" indent="0" marL="0">
+              <a:buNone/>
             </a:pPr>
             <a:r>
               <a:rPr/>
-              <a:t>Tentative gap - what do you think it is?</a:t>
-            </a:r>
-          </a:p>
-          <a:p>
-            <a:pPr lvl="0" indent="-342900" marL="342900">
-              <a:buAutoNum type="arabicPeriod"/>
-            </a:pPr>
-            <a:r>
-              <a:rPr/>
-              <a:t>Scaffold your review - how many sections? do you need subsections? Add preliminary citations</a:t>
-            </a:r>
-          </a:p>
-          <a:p>
-            <a:pPr lvl="0" indent="-342900" marL="342900">
-              <a:buAutoNum type="arabicPeriod"/>
-            </a:pPr>
-            <a:r>
-              <a:rPr/>
-              <a:t>Develop a sense of key transitions - what’s the drama in the review? “also argued”, “moreover” etc</a:t>
-            </a:r>
-          </a:p>
-          <a:p>
-            <a:pPr lvl="0" indent="-342900" marL="342900">
-              <a:buAutoNum type="arabicPeriod"/>
-            </a:pPr>
-            <a:r>
-              <a:rPr/>
-              <a:t>Be light, noncommital - prepared to cut/paste</a:t>
-            </a:r>
-          </a:p>
-          <a:p>
-            <a:pPr lvl="0" indent="-342900" marL="342900">
-              <a:buAutoNum type="arabicPeriod"/>
-            </a:pPr>
-            <a:r>
-              <a:rPr/>
-              <a:t>As your literature grows, you might need to </a:t>
-            </a:r>
-            <a:r>
-              <a:rPr i="1"/>
-              <a:t>qualify</a:t>
-            </a:r>
-            <a:r>
-              <a:rPr/>
-              <a:t> the statement of the gap. Maybe there </a:t>
-            </a:r>
-            <a:r>
-              <a:rPr b="1"/>
-              <a:t>are</a:t>
-            </a:r>
-            <a:r>
-              <a:rPr/>
-              <a:t> studies of the general topic X - but you can add </a:t>
-            </a:r>
-            <a:r>
-              <a:rPr i="1"/>
-              <a:t>adjectives</a:t>
-            </a:r>
-            <a:r>
-              <a:rPr/>
-              <a:t> to the gap (research question) to narrow it down… Go back to Step 1, rinse and repeat…</a:t>
+              <a:t>Spivak, G. C. (2023). Can the subaltern speak?. In Imperialism (pp. 171-219). Routledge. http://users.uoa.gr/~cdokou/TheoryCriticismTexts/Spivak-Subaltern.pdf</a:t>
             </a:r>
           </a:p>
         </p:txBody>
@@ -5171,6 +4963,31 @@
       </p:grpSpPr>
       <p:sp>
         <p:nvSpPr>
+          <p:cNvPr id="2" name="Title 1"/>
+          <p:cNvSpPr>
+            <a:spLocks noGrp="1"/>
+          </p:cNvSpPr>
+          <p:nvPr>
+            <p:ph type="title"/>
+          </p:nvPr>
+        </p:nvSpPr>
+        <p:spPr/>
+        <p:txBody>
+          <a:bodyPr/>
+          <a:lstStyle/>
+          <a:p>
+            <a:pPr lvl="0" indent="0" marL="0">
+              <a:buNone/>
+            </a:pPr>
+            <a:r>
+              <a:rPr/>
+              <a:t>Hour 3</a:t>
+            </a:r>
+          </a:p>
+        </p:txBody>
+      </p:sp>
+      <p:sp>
+        <p:nvSpPr>
           <p:cNvPr id="3" name="Content Placeholder 2"/>
           <p:cNvSpPr>
             <a:spLocks noGrp="1"/>
@@ -5192,49 +5009,7 @@
             </a:pPr>
             <a:r>
               <a:rPr b="1"/>
-              <a:t>Also consider</a:t>
-            </a:r>
-          </a:p>
-          <a:p>
-            <a:pPr lvl="0"/>
-            <a:r>
-              <a:rPr/>
-              <a:t>Different perspectives - outside the ordinary frame of discipline, time</a:t>
-            </a:r>
-          </a:p>
-          <a:p>
-            <a:pPr lvl="1"/>
-            <a:r>
-              <a:rPr/>
-              <a:t>e.g. “heteroscopia” (“many visions”) - concept by Jaireth (2001) to describe Indian cinema</a:t>
-            </a:r>
-          </a:p>
-          <a:p>
-            <a:pPr lvl="1"/>
-            <a:r>
-              <a:rPr/>
-              <a:t>But also a useful term for thinking about machinic vision, generative AI</a:t>
-            </a:r>
-          </a:p>
-          <a:p>
-            <a:pPr lvl="0"/>
-            <a:r>
-              <a:rPr/>
-              <a:t>Less-known authors (especially not widely cited) - this can enrich a review, demonstrating greater awareness beyond the same few authors / studies…</a:t>
-            </a:r>
-          </a:p>
-          <a:p>
-            <a:pPr lvl="1"/>
-            <a:r>
-              <a:rPr/>
-              <a:t>e.g. History of AI - typically focussed on US developments. But Schmidhuber (1922) argues the importance of developments in Ukraine (USSR), Japan, Finland in the 1960s/70s. Who knew?</a:t>
-            </a:r>
-          </a:p>
-          <a:p>
-            <a:pPr lvl="0"/>
-            <a:r>
-              <a:rPr b="1"/>
-              <a:t>In short: surprise us!</a:t>
+              <a:t>Designing a Literature Review</a:t>
             </a:r>
           </a:p>
         </p:txBody>
@@ -5284,93 +5059,176 @@
             </a:pPr>
             <a:r>
               <a:rPr b="1"/>
-              <a:t>Growing your database</a:t>
-            </a:r>
-          </a:p>
-          <a:p>
-            <a:pPr lvl="0" indent="0" marL="0">
-              <a:buNone/>
+              <a:t>Checklist:</a:t>
+            </a:r>
+          </a:p>
+          <a:p>
+            <a:pPr lvl="0" indent="-342900" marL="342900">
+              <a:buAutoNum type="arabicPeriod"/>
             </a:pPr>
             <a:r>
               <a:rPr/>
-              <a:t>Different techniques for expanding your database:</a:t>
-            </a:r>
-          </a:p>
-          <a:p>
-            <a:pPr lvl="0"/>
-            <a:r>
-              <a:rPr/>
-              <a:t>Search (Google Scholar / library databases)</a:t>
-            </a:r>
-          </a:p>
-          <a:p>
-            <a:pPr lvl="0"/>
-            <a:r>
-              <a:rPr/>
-              <a:t>With existing articles:</a:t>
-            </a:r>
-          </a:p>
-          <a:p>
-            <a:pPr lvl="1"/>
-            <a:r>
-              <a:rPr b="1"/>
-              <a:t>Go back</a:t>
-            </a:r>
-            <a:r>
-              <a:rPr/>
-              <a:t>: Scan </a:t>
+              <a:t>What are the key terms of the (draft) research question? List them…</a:t>
+            </a:r>
+          </a:p>
+          <a:p>
+            <a:pPr lvl="0" indent="-342900" marL="342900">
+              <a:buAutoNum type="arabicPeriod"/>
+            </a:pPr>
+            <a:r>
+              <a:rPr/>
+              <a:t>What are the </a:t>
             </a:r>
             <a:r>
               <a:rPr i="1"/>
-              <a:t>references</a:t>
-            </a:r>
-            <a:r>
-              <a:rPr/>
-              <a:t> of this article</a:t>
-            </a:r>
-          </a:p>
-          <a:p>
-            <a:pPr lvl="1"/>
-            <a:r>
-              <a:rPr b="1"/>
-              <a:t>Go forward</a:t>
-            </a:r>
-            <a:r>
-              <a:rPr/>
-              <a:t>: Search for </a:t>
+              <a:t>norms</a:t>
+            </a:r>
+            <a:r>
+              <a:rPr/>
+              <a:t> of your field? And what </a:t>
             </a:r>
             <a:r>
               <a:rPr i="1"/>
-              <a:t>citations</a:t>
-            </a:r>
-            <a:r>
-              <a:rPr/>
-              <a:t> of this article</a:t>
-            </a:r>
-          </a:p>
-          <a:p>
-            <a:pPr lvl="1"/>
-            <a:r>
-              <a:rPr b="1"/>
-              <a:t>Go sideways</a:t>
-            </a:r>
-            <a:r>
-              <a:rPr/>
-              <a:t>: What else was published in the same journal / issue</a:t>
-            </a:r>
-          </a:p>
-          <a:p>
-            <a:pPr lvl="0"/>
-            <a:r>
-              <a:rPr/>
-              <a:t>Check common “authorities”: Wikipedia, syllabi, AI</a:t>
-            </a:r>
-          </a:p>
-          <a:p>
-            <a:pPr lvl="1"/>
-            <a:r>
-              <a:rPr/>
-              <a:t>e.g. “Critical AI” - people will be citing Bender et al. (2021) stochastic parrots paper</a:t>
+              <a:t>is</a:t>
+            </a:r>
+            <a:r>
+              <a:rPr/>
+              <a:t> your field?</a:t>
+            </a:r>
+          </a:p>
+          <a:p>
+            <a:pPr lvl="0" indent="-342900" marL="342900">
+              <a:buAutoNum type="arabicPeriod"/>
+            </a:pPr>
+            <a:r>
+              <a:rPr/>
+              <a:t>What is a reasonable </a:t>
+            </a:r>
+            <a:r>
+              <a:rPr i="1"/>
+              <a:t>method</a:t>
+            </a:r>
+            <a:r>
+              <a:rPr/>
+              <a:t> or </a:t>
+            </a:r>
+            <a:r>
+              <a:rPr i="1"/>
+              <a:t>recipe</a:t>
+            </a:r>
+            <a:r>
+              <a:rPr/>
+              <a:t> for your literature review?</a:t>
+            </a:r>
+          </a:p>
+          <a:p>
+            <a:pPr lvl="0" indent="-342900" marL="342900">
+              <a:buAutoNum type="arabicPeriod"/>
+            </a:pPr>
+            <a:r>
+              <a:rPr/>
+              <a:t>What are </a:t>
+            </a:r>
+            <a:r>
+              <a:rPr i="1"/>
+              <a:t>related terms</a:t>
+            </a:r>
+            <a:r>
+              <a:rPr/>
+              <a:t> (can AI find reasonable synonyms)?</a:t>
+            </a:r>
+          </a:p>
+          <a:p>
+            <a:pPr lvl="0" indent="-342900" marL="342900">
+              <a:buAutoNum type="arabicPeriod"/>
+            </a:pPr>
+            <a:r>
+              <a:rPr/>
+              <a:t>What do you get when you search </a:t>
+            </a:r>
+            <a:r>
+              <a:rPr i="1"/>
+              <a:t>Google Scholar</a:t>
+            </a:r>
+            <a:r>
+              <a:rPr/>
+              <a:t> / </a:t>
+            </a:r>
+            <a:r>
+              <a:rPr i="1"/>
+              <a:t>library databases</a:t>
+            </a:r>
+            <a:r>
+              <a:rPr/>
+              <a:t> for these terms?</a:t>
+            </a:r>
+          </a:p>
+          <a:p>
+            <a:pPr lvl="0" indent="-342900" marL="342900">
+              <a:buAutoNum type="arabicPeriod"/>
+            </a:pPr>
+            <a:r>
+              <a:rPr/>
+              <a:t>Do you have </a:t>
+            </a:r>
+            <a:r>
+              <a:rPr i="1"/>
+              <a:t>existing articles</a:t>
+            </a:r>
+            <a:r>
+              <a:rPr/>
+              <a:t> / authors to draw from?</a:t>
+            </a:r>
+          </a:p>
+          <a:p>
+            <a:pPr lvl="0" indent="-342900" marL="342900">
+              <a:buAutoNum type="arabicPeriod"/>
+            </a:pPr>
+            <a:r>
+              <a:rPr/>
+              <a:t>What </a:t>
+            </a:r>
+            <a:r>
+              <a:rPr i="1"/>
+              <a:t>citation system</a:t>
+            </a:r>
+            <a:r>
+              <a:rPr/>
+              <a:t> are you using? Can you code / organize literature in the way you’d like?</a:t>
+            </a:r>
+          </a:p>
+          <a:p>
+            <a:pPr lvl="0" indent="-342900" marL="342900">
+              <a:buAutoNum type="arabicPeriod"/>
+            </a:pPr>
+            <a:r>
+              <a:rPr/>
+              <a:t>What is the best </a:t>
+            </a:r>
+            <a:r>
+              <a:rPr i="1"/>
+              <a:t>organization</a:t>
+            </a:r>
+            <a:r>
+              <a:rPr/>
+              <a:t> of the literature? Thematic, field (for multi-/interdisciplinary work), chronological, spatial, general / special?</a:t>
+            </a:r>
+          </a:p>
+          <a:p>
+            <a:pPr lvl="0" indent="-342900" marL="342900">
+              <a:buAutoNum type="arabicPeriod"/>
+            </a:pPr>
+            <a:r>
+              <a:rPr/>
+              <a:t>Are there </a:t>
+            </a:r>
+            <a:r>
+              <a:rPr i="1"/>
+              <a:t>classics</a:t>
+            </a:r>
+            <a:r>
+              <a:rPr/>
+              <a:t> you are expected to cite? References with very large number of citations (e.g. Braun &amp; Clarke 2006; Vaswani et al. 2017; Bender et al. 2021)?</a:t>
             </a:r>
           </a:p>
         </p:txBody>
@@ -5420,101 +5278,108 @@
             </a:pPr>
             <a:r>
               <a:rPr b="1"/>
-              <a:t>This Week’s Activity</a:t>
-            </a:r>
-          </a:p>
-          <a:p>
-            <a:pPr lvl="0" indent="-342900" marL="342900">
-              <a:buAutoNum type="arabicPeriod"/>
+              <a:t>Do some sketches: “fast” review</a:t>
+            </a:r>
+          </a:p>
+          <a:p>
+            <a:pPr lvl="0"/>
+            <a:r>
+              <a:rPr b="1"/>
+              <a:t>Time</a:t>
+            </a:r>
+            <a:r>
+              <a:rPr/>
+              <a:t>, followed by </a:t>
+            </a:r>
+            <a:r>
+              <a:rPr b="1"/>
+              <a:t>theme</a:t>
+            </a:r>
+            <a:r>
+              <a:rPr/>
+              <a:t>, followed by </a:t>
+            </a:r>
+            <a:r>
+              <a:rPr b="1"/>
+              <a:t>space</a:t>
+            </a:r>
+          </a:p>
+          <a:p>
+            <a:pPr lvl="0"/>
+            <a:r>
+              <a:rPr/>
+              <a:t>Just be approximate</a:t>
+            </a:r>
+          </a:p>
+          <a:p>
+            <a:pPr lvl="0" indent="0" marL="0">
+              <a:buNone/>
             </a:pPr>
             <a:r>
               <a:rPr/>
-              <a:t>Write down the gap (should be close to your research question)</a:t>
-            </a:r>
-          </a:p>
-          <a:p>
-            <a:pPr lvl="0" indent="-342900" marL="342900">
-              <a:buAutoNum type="arabicPeriod"/>
-            </a:pPr>
-            <a:r>
-              <a:rPr/>
-              <a:t>Write down your assumed audience / field. What do you know about them? Do they prefer lots of recent citations (science)? Or fewer, with more emphasis on the classics (philosophy, theory, some qual studies)?</a:t>
-            </a:r>
-          </a:p>
-          <a:p>
-            <a:pPr lvl="0" indent="-342900" marL="342900">
-              <a:buAutoNum type="arabicPeriod"/>
-            </a:pPr>
-            <a:r>
-              <a:rPr/>
-              <a:t>Create a short plan / recipe method:</a:t>
-            </a:r>
-          </a:p>
-          <a:p>
-            <a:pPr lvl="1"/>
-            <a:r>
-              <a:rPr/>
-              <a:t>“Search for these terms / filters”</a:t>
-            </a:r>
-          </a:p>
-          <a:p>
-            <a:pPr lvl="1"/>
-            <a:r>
-              <a:rPr/>
-              <a:t>“Create a database of 10 articles”</a:t>
-            </a:r>
-          </a:p>
-          <a:p>
-            <a:pPr lvl="1"/>
-            <a:r>
-              <a:rPr/>
-              <a:t>“Scan the articles for relevance - discard those that are not relevant”</a:t>
-            </a:r>
-          </a:p>
-          <a:p>
-            <a:pPr lvl="1"/>
-            <a:r>
-              <a:rPr/>
-              <a:t>“With remaining articles: review references, search for more recent citations”</a:t>
-            </a:r>
-          </a:p>
-          <a:p>
-            <a:pPr lvl="1"/>
-            <a:r>
-              <a:rPr/>
-              <a:t>“Once I have 50 articles: code / annototate for relevance”</a:t>
-            </a:r>
-          </a:p>
-          <a:p>
-            <a:pPr lvl="1"/>
-            <a:r>
-              <a:rPr/>
-              <a:t>“Map out review structure; add citations, continue to search under subheadings”</a:t>
-            </a:r>
-          </a:p>
-          <a:p>
-            <a:pPr lvl="1"/>
-            <a:r>
-              <a:rPr/>
-              <a:t>“Supply list of refs to AI and ask if I’m missing anything crucial” &lt;!–</a:t>
-            </a:r>
-          </a:p>
-          <a:p>
-            <a:pPr lvl="0" indent="-342900" marL="342900">
-              <a:buAutoNum type="arabicPeriod"/>
-            </a:pPr>
-            <a:r>
-              <a:rPr/>
-              <a:t>Develop a rough structure of headings / subheadings</a:t>
-            </a:r>
-          </a:p>
-          <a:p>
-            <a:pPr lvl="0" indent="-342900" marL="342900">
-              <a:buAutoNum type="arabicPeriod"/>
-            </a:pPr>
-            <a:r>
-              <a:rPr/>
-              <a:t>Lay in some initial citations (if you know them), with indicative transitional language (“also”, “however” etc) –&gt;</a:t>
+              <a:t>“Criticism of AI </a:t>
+            </a:r>
+            <a:r>
+              <a:rPr b="1"/>
+              <a:t>dates back</a:t>
+            </a:r>
+            <a:r>
+              <a:rPr/>
+              <a:t> to the inception of the field itself. For example, Dreyfus (1966 - or thereabouts) discussed the brittleness of (etc)… By the early 1980s, scepticism voiced by philosophers such as Searle (1981) in his famous”Chinese room” experiment, contributed to the emergence of an AI winter. </a:t>
+            </a:r>
+            <a:r>
+              <a:rPr b="1"/>
+              <a:t>More recently</a:t>
+            </a:r>
+            <a:r>
+              <a:rPr/>
+              <a:t>, as generative AI has largely revived the field, criticism has been directed toward both issues of </a:t>
+            </a:r>
+            <a:r>
+              <a:rPr b="1"/>
+              <a:t>social justice and bias</a:t>
+            </a:r>
+            <a:r>
+              <a:rPr/>
+              <a:t> (e.g. Bender et al. 2021) and potential </a:t>
+            </a:r>
+            <a:r>
+              <a:rPr b="1"/>
+              <a:t>existential risk</a:t>
+            </a:r>
+            <a:r>
+              <a:rPr/>
+              <a:t> (e.g. lesswrong blog). In some cases, critical AI scholars have also argued the existential case is a convenient disguise that obscures more immediate negative social effects (Gebru and Torres 2024). Moreover scholars from </a:t>
+            </a:r>
+            <a:r>
+              <a:rPr b="1"/>
+              <a:t>outside the US</a:t>
+            </a:r>
+            <a:r>
+              <a:rPr/>
+              <a:t> - particularly in the Global South – have begun to argue AI constitutes a form of </a:t>
+            </a:r>
+            <a:r>
+              <a:rPr b="1"/>
+              <a:t>neocolonialism</a:t>
+            </a:r>
+            <a:r>
+              <a:rPr/>
+              <a:t>, impacting digital sovereignty (Keerthiraj, &amp; Misra 2025)”</a:t>
+            </a:r>
+          </a:p>
+          <a:p>
+            <a:pPr lvl="0"/>
+            <a:r>
+              <a:rPr/>
+              <a:t>Can work with or without AI - useful just to test how this or that understanding helps make your case (about gaps)</a:t>
+            </a:r>
+          </a:p>
+          <a:p>
+            <a:pPr lvl="0"/>
+            <a:r>
+              <a:rPr/>
+              <a:t>Don’t commit to this structure just yet!</a:t>
             </a:r>
           </a:p>
         </p:txBody>
@@ -5564,33 +5429,168 @@
             </a:pPr>
             <a:r>
               <a:rPr b="1"/>
-              <a:t>Next Week’s Readings</a:t>
-            </a:r>
-          </a:p>
+              <a:t>Then develop a plan…</a:t>
+            </a:r>
+          </a:p>
+          <a:p>
+            <a:pPr lvl="0" indent="-342900" marL="342900">
+              <a:buAutoNum type="arabicPeriod"/>
+            </a:pPr>
+            <a:r>
+              <a:rPr/>
+              <a:t>Tentative gap - what do you think it is?</a:t>
+            </a:r>
+          </a:p>
+          <a:p>
+            <a:pPr lvl="0" indent="-342900" marL="342900">
+              <a:buAutoNum type="arabicPeriod"/>
+            </a:pPr>
+            <a:r>
+              <a:rPr/>
+              <a:t>Scaffold your review - how many sections? do you need subsections? Add preliminary citations</a:t>
+            </a:r>
+          </a:p>
+          <a:p>
+            <a:pPr lvl="0" indent="-342900" marL="342900">
+              <a:buAutoNum type="arabicPeriod"/>
+            </a:pPr>
+            <a:r>
+              <a:rPr/>
+              <a:t>Develop a sense of key transitions - what’s the drama in the review? “also argued”, “moreover” etc</a:t>
+            </a:r>
+          </a:p>
+          <a:p>
+            <a:pPr lvl="0" indent="-342900" marL="342900">
+              <a:buAutoNum type="arabicPeriod"/>
+            </a:pPr>
+            <a:r>
+              <a:rPr/>
+              <a:t>Be light, noncommital - prepared to cut/paste</a:t>
+            </a:r>
+          </a:p>
+          <a:p>
+            <a:pPr lvl="0" indent="-342900" marL="342900">
+              <a:buAutoNum type="arabicPeriod"/>
+            </a:pPr>
+            <a:r>
+              <a:rPr/>
+              <a:t>As your literature grows, you might need to </a:t>
+            </a:r>
+            <a:r>
+              <a:rPr i="1"/>
+              <a:t>qualify</a:t>
+            </a:r>
+            <a:r>
+              <a:rPr/>
+              <a:t> the statement of the gap. Maybe there </a:t>
+            </a:r>
+            <a:r>
+              <a:rPr b="1"/>
+              <a:t>are</a:t>
+            </a:r>
+            <a:r>
+              <a:rPr/>
+              <a:t> studies of the general topic X - but you can add </a:t>
+            </a:r>
+            <a:r>
+              <a:rPr i="1"/>
+              <a:t>adjectives</a:t>
+            </a:r>
+            <a:r>
+              <a:rPr/>
+              <a:t> to the gap (research question) to narrow it down… Go back to Step 1, rinse and repeat…</a:t>
+            </a:r>
+          </a:p>
+        </p:txBody>
+      </p:sp>
+    </p:spTree>
+  </p:cSld>
+</p:sld>
+</file>
+
+<file path=ppt/slides/slide29.xml><?xml version="1.0" encoding="utf-8"?>
+<p:sld xmlns:a="http://schemas.openxmlformats.org/drawingml/2006/main" xmlns:r="http://schemas.openxmlformats.org/officeDocument/2006/relationships" xmlns:p="http://schemas.openxmlformats.org/presentationml/2006/main">
+  <p:cSld>
+    <p:spTree>
+      <p:nvGrpSpPr>
+        <p:cNvPr id="1" name=""/>
+        <p:cNvGrpSpPr/>
+        <p:nvPr/>
+      </p:nvGrpSpPr>
+      <p:grpSpPr>
+        <a:xfrm>
+          <a:off x="0" y="0"/>
+          <a:ext cx="0" cy="0"/>
+          <a:chOff x="0" y="0"/>
+          <a:chExt cx="0" cy="0"/>
+        </a:xfrm>
+      </p:grpSpPr>
+      <p:sp>
+        <p:nvSpPr>
+          <p:cNvPr id="3" name="Content Placeholder 2"/>
+          <p:cNvSpPr>
+            <a:spLocks noGrp="1"/>
+          </p:cNvSpPr>
+          <p:nvPr>
+            <p:ph idx="1"/>
+          </p:nvPr>
+        </p:nvSpPr>
+        <p:spPr/>
+        <p:txBody>
+          <a:bodyPr/>
+          <a:lstStyle/>
           <a:p>
             <a:pPr lvl="0" indent="0" marL="0">
+              <a:spcBef>
+                <a:spcPts val="3000"/>
+              </a:spcBef>
               <a:buNone/>
             </a:pPr>
             <a:r>
-              <a:rPr>
-                <a:hlinkClick r:id="rId2"/>
-              </a:rPr>
-              <a:t>sciencepolicy.colorado.edu</a:t>
-            </a:r>
-          </a:p>
-          <a:p>
-            <a:pPr lvl="0" indent="0" marL="0">
-              <a:buNone/>
-            </a:pPr>
-            <a:r>
-              <a:rPr/>
-              <a:t>Aarseth, E. J. (1997). Cybertext: Perspectives on ergodic literature. JHU Press. </a:t>
-            </a:r>
-            <a:r>
-              <a:rPr>
-                <a:hlinkClick r:id="rId3"/>
-              </a:rPr>
-              <a:t>williamwolff.org</a:t>
+              <a:rPr b="1"/>
+              <a:t>Also consider</a:t>
+            </a:r>
+          </a:p>
+          <a:p>
+            <a:pPr lvl="0"/>
+            <a:r>
+              <a:rPr/>
+              <a:t>Different perspectives - outside the ordinary frame of discipline, time</a:t>
+            </a:r>
+          </a:p>
+          <a:p>
+            <a:pPr lvl="1"/>
+            <a:r>
+              <a:rPr/>
+              <a:t>e.g. “heteroscopia” (“many visions”) - concept by Jaireth (2001) to describe Indian cinema</a:t>
+            </a:r>
+          </a:p>
+          <a:p>
+            <a:pPr lvl="1"/>
+            <a:r>
+              <a:rPr/>
+              <a:t>But also a useful term for thinking about machinic vision, generative AI</a:t>
+            </a:r>
+          </a:p>
+          <a:p>
+            <a:pPr lvl="0"/>
+            <a:r>
+              <a:rPr/>
+              <a:t>Less-known authors (especially not widely cited) - this can enrich a review, demonstrating greater awareness beyond the same few authors / studies…</a:t>
+            </a:r>
+          </a:p>
+          <a:p>
+            <a:pPr lvl="1"/>
+            <a:r>
+              <a:rPr/>
+              <a:t>e.g. History of AI - typically focussed on US developments. But Schmidhuber (1922) argues the importance of developments in Ukraine (USSR), Japan, Finland in the 1960s/70s. Who knew?</a:t>
+            </a:r>
+          </a:p>
+          <a:p>
+            <a:pPr lvl="0"/>
+            <a:r>
+              <a:rPr b="1"/>
+              <a:t>In short: surprise us!</a:t>
             </a:r>
           </a:p>
         </p:txBody>
@@ -6188,6 +6188,351 @@
           </a:graphicData>
         </a:graphic>
       </p:graphicFrame>
+    </p:spTree>
+  </p:cSld>
+</p:sld>
+</file>
+
+<file path=ppt/slides/slide30.xml><?xml version="1.0" encoding="utf-8"?>
+<p:sld xmlns:a="http://schemas.openxmlformats.org/drawingml/2006/main" xmlns:r="http://schemas.openxmlformats.org/officeDocument/2006/relationships" xmlns:p="http://schemas.openxmlformats.org/presentationml/2006/main">
+  <p:cSld>
+    <p:spTree>
+      <p:nvGrpSpPr>
+        <p:cNvPr id="1" name=""/>
+        <p:cNvGrpSpPr/>
+        <p:nvPr/>
+      </p:nvGrpSpPr>
+      <p:grpSpPr>
+        <a:xfrm>
+          <a:off x="0" y="0"/>
+          <a:ext cx="0" cy="0"/>
+          <a:chOff x="0" y="0"/>
+          <a:chExt cx="0" cy="0"/>
+        </a:xfrm>
+      </p:grpSpPr>
+      <p:sp>
+        <p:nvSpPr>
+          <p:cNvPr id="3" name="Content Placeholder 2"/>
+          <p:cNvSpPr>
+            <a:spLocks noGrp="1"/>
+          </p:cNvSpPr>
+          <p:nvPr>
+            <p:ph idx="1"/>
+          </p:nvPr>
+        </p:nvSpPr>
+        <p:spPr/>
+        <p:txBody>
+          <a:bodyPr/>
+          <a:lstStyle/>
+          <a:p>
+            <a:pPr lvl="0" indent="0" marL="0">
+              <a:spcBef>
+                <a:spcPts val="3000"/>
+              </a:spcBef>
+              <a:buNone/>
+            </a:pPr>
+            <a:r>
+              <a:rPr b="1"/>
+              <a:t>Growing your database</a:t>
+            </a:r>
+          </a:p>
+          <a:p>
+            <a:pPr lvl="0" indent="0" marL="0">
+              <a:buNone/>
+            </a:pPr>
+            <a:r>
+              <a:rPr/>
+              <a:t>Different techniques for expanding your database:</a:t>
+            </a:r>
+          </a:p>
+          <a:p>
+            <a:pPr lvl="0"/>
+            <a:r>
+              <a:rPr/>
+              <a:t>Search (Google Scholar / library databases)</a:t>
+            </a:r>
+          </a:p>
+          <a:p>
+            <a:pPr lvl="0"/>
+            <a:r>
+              <a:rPr/>
+              <a:t>With existing articles:</a:t>
+            </a:r>
+          </a:p>
+          <a:p>
+            <a:pPr lvl="1"/>
+            <a:r>
+              <a:rPr b="1"/>
+              <a:t>Go back</a:t>
+            </a:r>
+            <a:r>
+              <a:rPr/>
+              <a:t>: Scan </a:t>
+            </a:r>
+            <a:r>
+              <a:rPr i="1"/>
+              <a:t>references</a:t>
+            </a:r>
+            <a:r>
+              <a:rPr/>
+              <a:t> of this article</a:t>
+            </a:r>
+          </a:p>
+          <a:p>
+            <a:pPr lvl="1"/>
+            <a:r>
+              <a:rPr b="1"/>
+              <a:t>Go forward</a:t>
+            </a:r>
+            <a:r>
+              <a:rPr/>
+              <a:t>: Search for </a:t>
+            </a:r>
+            <a:r>
+              <a:rPr i="1"/>
+              <a:t>citations</a:t>
+            </a:r>
+            <a:r>
+              <a:rPr/>
+              <a:t> of this article</a:t>
+            </a:r>
+          </a:p>
+          <a:p>
+            <a:pPr lvl="1"/>
+            <a:r>
+              <a:rPr b="1"/>
+              <a:t>Go sideways</a:t>
+            </a:r>
+            <a:r>
+              <a:rPr/>
+              <a:t>: What else was published in the same journal / issue</a:t>
+            </a:r>
+          </a:p>
+          <a:p>
+            <a:pPr lvl="0"/>
+            <a:r>
+              <a:rPr/>
+              <a:t>Check common “authorities”: Wikipedia, syllabi, AI</a:t>
+            </a:r>
+          </a:p>
+          <a:p>
+            <a:pPr lvl="1"/>
+            <a:r>
+              <a:rPr/>
+              <a:t>e.g. “Critical AI” - people will be citing Bender et al. (2021) stochastic parrots paper</a:t>
+            </a:r>
+          </a:p>
+        </p:txBody>
+      </p:sp>
+    </p:spTree>
+  </p:cSld>
+</p:sld>
+</file>
+
+<file path=ppt/slides/slide31.xml><?xml version="1.0" encoding="utf-8"?>
+<p:sld xmlns:a="http://schemas.openxmlformats.org/drawingml/2006/main" xmlns:r="http://schemas.openxmlformats.org/officeDocument/2006/relationships" xmlns:p="http://schemas.openxmlformats.org/presentationml/2006/main">
+  <p:cSld>
+    <p:spTree>
+      <p:nvGrpSpPr>
+        <p:cNvPr id="1" name=""/>
+        <p:cNvGrpSpPr/>
+        <p:nvPr/>
+      </p:nvGrpSpPr>
+      <p:grpSpPr>
+        <a:xfrm>
+          <a:off x="0" y="0"/>
+          <a:ext cx="0" cy="0"/>
+          <a:chOff x="0" y="0"/>
+          <a:chExt cx="0" cy="0"/>
+        </a:xfrm>
+      </p:grpSpPr>
+      <p:sp>
+        <p:nvSpPr>
+          <p:cNvPr id="3" name="Content Placeholder 2"/>
+          <p:cNvSpPr>
+            <a:spLocks noGrp="1"/>
+          </p:cNvSpPr>
+          <p:nvPr>
+            <p:ph idx="1"/>
+          </p:nvPr>
+        </p:nvSpPr>
+        <p:spPr/>
+        <p:txBody>
+          <a:bodyPr/>
+          <a:lstStyle/>
+          <a:p>
+            <a:pPr lvl="0" indent="0" marL="0">
+              <a:spcBef>
+                <a:spcPts val="3000"/>
+              </a:spcBef>
+              <a:buNone/>
+            </a:pPr>
+            <a:r>
+              <a:rPr b="1"/>
+              <a:t>This Week’s Activity</a:t>
+            </a:r>
+          </a:p>
+          <a:p>
+            <a:pPr lvl="0" indent="-342900" marL="342900">
+              <a:buAutoNum type="arabicPeriod"/>
+            </a:pPr>
+            <a:r>
+              <a:rPr/>
+              <a:t>Write down the gap (should be close to your research question)</a:t>
+            </a:r>
+          </a:p>
+          <a:p>
+            <a:pPr lvl="0" indent="-342900" marL="342900">
+              <a:buAutoNum type="arabicPeriod"/>
+            </a:pPr>
+            <a:r>
+              <a:rPr/>
+              <a:t>Write down your assumed audience / field. What do you know about them? Do they prefer lots of recent citations (science)? Or fewer, with more emphasis on the classics (philosophy, theory, some qual studies)?</a:t>
+            </a:r>
+          </a:p>
+          <a:p>
+            <a:pPr lvl="0" indent="-342900" marL="342900">
+              <a:buAutoNum type="arabicPeriod"/>
+            </a:pPr>
+            <a:r>
+              <a:rPr/>
+              <a:t>Create a short plan / recipe method:</a:t>
+            </a:r>
+          </a:p>
+          <a:p>
+            <a:pPr lvl="1"/>
+            <a:r>
+              <a:rPr/>
+              <a:t>“Search for these terms / filters”</a:t>
+            </a:r>
+          </a:p>
+          <a:p>
+            <a:pPr lvl="1"/>
+            <a:r>
+              <a:rPr/>
+              <a:t>“Create a database of 10 articles”</a:t>
+            </a:r>
+          </a:p>
+          <a:p>
+            <a:pPr lvl="1"/>
+            <a:r>
+              <a:rPr/>
+              <a:t>“Scan the articles for relevance - discard those that are not relevant”</a:t>
+            </a:r>
+          </a:p>
+          <a:p>
+            <a:pPr lvl="1"/>
+            <a:r>
+              <a:rPr/>
+              <a:t>“With remaining articles: review references, search for more recent citations”</a:t>
+            </a:r>
+          </a:p>
+          <a:p>
+            <a:pPr lvl="1"/>
+            <a:r>
+              <a:rPr/>
+              <a:t>“Once I have 50 articles: code / annototate for relevance”</a:t>
+            </a:r>
+          </a:p>
+          <a:p>
+            <a:pPr lvl="1"/>
+            <a:r>
+              <a:rPr/>
+              <a:t>“Map out review structure; add citations, continue to search under subheadings”</a:t>
+            </a:r>
+          </a:p>
+          <a:p>
+            <a:pPr lvl="1"/>
+            <a:r>
+              <a:rPr/>
+              <a:t>“Supply list of refs to AI and ask if I’m missing anything crucial” &lt;!–</a:t>
+            </a:r>
+          </a:p>
+          <a:p>
+            <a:pPr lvl="0" indent="-342900" marL="342900">
+              <a:buAutoNum type="arabicPeriod"/>
+            </a:pPr>
+            <a:r>
+              <a:rPr/>
+              <a:t>Develop a rough structure of headings / subheadings</a:t>
+            </a:r>
+          </a:p>
+          <a:p>
+            <a:pPr lvl="0" indent="-342900" marL="342900">
+              <a:buAutoNum type="arabicPeriod"/>
+            </a:pPr>
+            <a:r>
+              <a:rPr/>
+              <a:t>Lay in some initial citations (if you know them), with indicative transitional language (“also”, “however” etc) –&gt;</a:t>
+            </a:r>
+          </a:p>
+        </p:txBody>
+      </p:sp>
+    </p:spTree>
+  </p:cSld>
+</p:sld>
+</file>
+
+<file path=ppt/slides/slide32.xml><?xml version="1.0" encoding="utf-8"?>
+<p:sld xmlns:a="http://schemas.openxmlformats.org/drawingml/2006/main" xmlns:r="http://schemas.openxmlformats.org/officeDocument/2006/relationships" xmlns:p="http://schemas.openxmlformats.org/presentationml/2006/main">
+  <p:cSld>
+    <p:spTree>
+      <p:nvGrpSpPr>
+        <p:cNvPr id="1" name=""/>
+        <p:cNvGrpSpPr/>
+        <p:nvPr/>
+      </p:nvGrpSpPr>
+      <p:grpSpPr>
+        <a:xfrm>
+          <a:off x="0" y="0"/>
+          <a:ext cx="0" cy="0"/>
+          <a:chOff x="0" y="0"/>
+          <a:chExt cx="0" cy="0"/>
+        </a:xfrm>
+      </p:grpSpPr>
+      <p:sp>
+        <p:nvSpPr>
+          <p:cNvPr id="3" name="Content Placeholder 2"/>
+          <p:cNvSpPr>
+            <a:spLocks noGrp="1"/>
+          </p:cNvSpPr>
+          <p:nvPr>
+            <p:ph idx="1"/>
+          </p:nvPr>
+        </p:nvSpPr>
+        <p:spPr/>
+        <p:txBody>
+          <a:bodyPr/>
+          <a:lstStyle/>
+          <a:p>
+            <a:pPr lvl="0" indent="0" marL="0">
+              <a:spcBef>
+                <a:spcPts val="3000"/>
+              </a:spcBef>
+              <a:buNone/>
+            </a:pPr>
+            <a:r>
+              <a:rPr b="1"/>
+              <a:t>Next Week’s Readings</a:t>
+            </a:r>
+          </a:p>
+          <a:p>
+            <a:pPr lvl="0" indent="0" marL="0">
+              <a:buNone/>
+            </a:pPr>
+            <a:r>
+              <a:rPr>
+                <a:hlinkClick r:id="rId2"/>
+              </a:rPr>
+              <a:t>sciencepolicy.colorado.edu</a:t>
+            </a:r>
+            <a:r>
+              <a:rPr/>
+              <a:t> </a:t>
+            </a:r>
+          </a:p>
+        </p:txBody>
+      </p:sp>
     </p:spTree>
   </p:cSld>
 </p:sld>

</xml_diff>